<commit_message>
Update Examination of Domestic Economic Impact of the US-China Trade War by Analyzing Stock Market Fluctuations with Unsupervised Machine Learning.pptx
</commit_message>
<xml_diff>
--- a/Examination of Domestic Economic Impact of the US-China Trade War by Analyzing Stock Market Fluctuations with Unsupervised Machine Learning.pptx
+++ b/Examination of Domestic Economic Impact of the US-China Trade War by Analyzing Stock Market Fluctuations with Unsupervised Machine Learning.pptx
@@ -5,53 +5,50 @@
     <p:sldMasterId id="2147483659" r:id="rId1"/>
   </p:sldMasterIdLst>
   <p:notesMasterIdLst>
-    <p:notesMasterId r:id="rId22"/>
+    <p:notesMasterId r:id="rId19"/>
   </p:notesMasterIdLst>
   <p:sldIdLst>
     <p:sldId id="256" r:id="rId2"/>
-    <p:sldId id="261" r:id="rId3"/>
-    <p:sldId id="262" r:id="rId4"/>
-    <p:sldId id="259" r:id="rId5"/>
-    <p:sldId id="260" r:id="rId6"/>
-    <p:sldId id="257" r:id="rId7"/>
-    <p:sldId id="258" r:id="rId8"/>
-    <p:sldId id="263" r:id="rId9"/>
-    <p:sldId id="264" r:id="rId10"/>
-    <p:sldId id="265" r:id="rId11"/>
-    <p:sldId id="270" r:id="rId12"/>
-    <p:sldId id="272" r:id="rId13"/>
-    <p:sldId id="273" r:id="rId14"/>
-    <p:sldId id="274" r:id="rId15"/>
-    <p:sldId id="266" r:id="rId16"/>
-    <p:sldId id="267" r:id="rId17"/>
-    <p:sldId id="268" r:id="rId18"/>
-    <p:sldId id="269" r:id="rId19"/>
-    <p:sldId id="275" r:id="rId20"/>
-    <p:sldId id="276" r:id="rId21"/>
+    <p:sldId id="259" r:id="rId3"/>
+    <p:sldId id="257" r:id="rId4"/>
+    <p:sldId id="258" r:id="rId5"/>
+    <p:sldId id="263" r:id="rId6"/>
+    <p:sldId id="264" r:id="rId7"/>
+    <p:sldId id="265" r:id="rId8"/>
+    <p:sldId id="270" r:id="rId9"/>
+    <p:sldId id="272" r:id="rId10"/>
+    <p:sldId id="273" r:id="rId11"/>
+    <p:sldId id="274" r:id="rId12"/>
+    <p:sldId id="266" r:id="rId13"/>
+    <p:sldId id="267" r:id="rId14"/>
+    <p:sldId id="268" r:id="rId15"/>
+    <p:sldId id="269" r:id="rId16"/>
+    <p:sldId id="275" r:id="rId17"/>
+    <p:sldId id="276" r:id="rId18"/>
   </p:sldIdLst>
   <p:sldSz cx="9144000" cy="5143500" type="screen16x9"/>
   <p:notesSz cx="6858000" cy="9144000"/>
   <p:embeddedFontLst>
     <p:embeddedFont>
       <p:font typeface="Calibri" panose="020F0502020204030204" pitchFamily="34" charset="0"/>
-      <p:regular r:id="rId23"/>
-      <p:bold r:id="rId24"/>
-      <p:italic r:id="rId25"/>
-      <p:boldItalic r:id="rId26"/>
+      <p:regular r:id="rId20"/>
+      <p:bold r:id="rId21"/>
+      <p:italic r:id="rId22"/>
+      <p:boldItalic r:id="rId23"/>
     </p:embeddedFont>
     <p:embeddedFont>
       <p:font typeface="Lato" panose="020B0604020202020204" charset="0"/>
-      <p:regular r:id="rId27"/>
-      <p:bold r:id="rId28"/>
-      <p:italic r:id="rId29"/>
-      <p:boldItalic r:id="rId30"/>
+      <p:regular r:id="rId24"/>
+      <p:bold r:id="rId25"/>
+      <p:italic r:id="rId26"/>
+      <p:boldItalic r:id="rId27"/>
     </p:embeddedFont>
     <p:embeddedFont>
       <p:font typeface="Raleway" panose="020B0604020202020204" charset="0"/>
-      <p:regular r:id="rId31"/>
-      <p:bold r:id="rId32"/>
-      <p:italic r:id="rId33"/>
-      <p:boldItalic r:id="rId34"/>
+      <p:regular r:id="rId28"/>
+      <p:bold r:id="rId29"/>
+      <p:italic r:id="rId30"/>
+      <p:boldItalic r:id="rId31"/>
     </p:embeddedFont>
   </p:embeddedFontLst>
   <p:defaultTextStyle>
@@ -10419,498 +10416,6 @@
           <p:cNvPr id="2" name="Title 1">
             <a:extLst>
               <a:ext uri="{FF2B5EF4-FFF2-40B4-BE49-F238E27FC236}">
-                <a16:creationId xmlns:a16="http://schemas.microsoft.com/office/drawing/2014/main" id="{A2373D7E-181B-49EE-A5DA-300CFD2B90BB}"/>
-              </a:ext>
-            </a:extLst>
-          </p:cNvPr>
-          <p:cNvSpPr>
-            <a:spLocks noGrp="1"/>
-          </p:cNvSpPr>
-          <p:nvPr>
-            <p:ph type="title"/>
-          </p:nvPr>
-        </p:nvSpPr>
-        <p:spPr>
-          <a:xfrm>
-            <a:off x="506085" y="93943"/>
-            <a:ext cx="7688400" cy="1518600"/>
-          </a:xfrm>
-        </p:spPr>
-        <p:txBody>
-          <a:bodyPr/>
-          <a:lstStyle/>
-          <a:p>
-            <a:r>
-              <a:rPr lang="en-US" sz="2000" dirty="0"/>
-              <a:t>Relationship between the price fluctuation of each cluster and the number of stocks of each cluster</a:t>
-            </a:r>
-          </a:p>
-        </p:txBody>
-      </p:sp>
-      <p:pic>
-        <p:nvPicPr>
-          <p:cNvPr id="3" name="Picture 2">
-            <a:extLst>
-              <a:ext uri="{FF2B5EF4-FFF2-40B4-BE49-F238E27FC236}">
-                <a16:creationId xmlns:a16="http://schemas.microsoft.com/office/drawing/2014/main" id="{17BD36A1-04AF-4BC1-ACC8-83E9FAB24F85}"/>
-              </a:ext>
-            </a:extLst>
-          </p:cNvPr>
-          <p:cNvPicPr>
-            <a:picLocks noChangeAspect="1"/>
-          </p:cNvPicPr>
-          <p:nvPr/>
-        </p:nvPicPr>
-        <p:blipFill>
-          <a:blip r:embed="rId2"/>
-          <a:stretch>
-            <a:fillRect/>
-          </a:stretch>
-        </p:blipFill>
-        <p:spPr>
-          <a:xfrm>
-            <a:off x="785944" y="1057469"/>
-            <a:ext cx="2864675" cy="3846365"/>
-          </a:xfrm>
-          <a:prstGeom prst="rect">
-            <a:avLst/>
-          </a:prstGeom>
-        </p:spPr>
-      </p:pic>
-      <p:sp>
-        <p:nvSpPr>
-          <p:cNvPr id="4" name="TextBox 3">
-            <a:extLst>
-              <a:ext uri="{FF2B5EF4-FFF2-40B4-BE49-F238E27FC236}">
-                <a16:creationId xmlns:a16="http://schemas.microsoft.com/office/drawing/2014/main" id="{B4D247F8-FC1D-4DF7-94F0-0D6622943EFC}"/>
-              </a:ext>
-            </a:extLst>
-          </p:cNvPr>
-          <p:cNvSpPr txBox="1"/>
-          <p:nvPr/>
-        </p:nvSpPr>
-        <p:spPr>
-          <a:xfrm>
-            <a:off x="4350285" y="1144745"/>
-            <a:ext cx="4200402" cy="1169551"/>
-          </a:xfrm>
-          <a:prstGeom prst="rect">
-            <a:avLst/>
-          </a:prstGeom>
-          <a:noFill/>
-        </p:spPr>
-        <p:txBody>
-          <a:bodyPr wrap="square" rtlCol="0">
-            <a:spAutoFit/>
-          </a:bodyPr>
-          <a:lstStyle/>
-          <a:p>
-            <a:r>
-              <a:rPr lang="en-US" dirty="0">
-                <a:solidFill>
-                  <a:schemeClr val="bg1"/>
-                </a:solidFill>
-              </a:rPr>
-              <a:t>When the U.S. firstly planned to counter unfair trade from China on June 28, 2016, more stock prices were increasing. There are more clusters of rising stocks. This pattern indicates that people had the confidence for</a:t>
-            </a:r>
-            <a:r>
-              <a:rPr lang="zh-CN" altLang="en-US" dirty="0">
-                <a:solidFill>
-                  <a:schemeClr val="bg1"/>
-                </a:solidFill>
-              </a:rPr>
-              <a:t> </a:t>
-            </a:r>
-            <a:r>
-              <a:rPr lang="en-US" altLang="zh-CN" dirty="0">
-                <a:solidFill>
-                  <a:schemeClr val="bg1"/>
-                </a:solidFill>
-              </a:rPr>
-              <a:t>US</a:t>
-            </a:r>
-            <a:r>
-              <a:rPr lang="zh-CN" altLang="en-US" dirty="0">
-                <a:solidFill>
-                  <a:schemeClr val="bg1"/>
-                </a:solidFill>
-              </a:rPr>
-              <a:t> </a:t>
-            </a:r>
-            <a:r>
-              <a:rPr lang="en-US" dirty="0">
-                <a:solidFill>
-                  <a:schemeClr val="bg1"/>
-                </a:solidFill>
-              </a:rPr>
-              <a:t>winning the Trade War. </a:t>
-            </a:r>
-          </a:p>
-        </p:txBody>
-      </p:sp>
-      <p:sp>
-        <p:nvSpPr>
-          <p:cNvPr id="5" name="TextBox 4">
-            <a:extLst>
-              <a:ext uri="{FF2B5EF4-FFF2-40B4-BE49-F238E27FC236}">
-                <a16:creationId xmlns:a16="http://schemas.microsoft.com/office/drawing/2014/main" id="{906026C9-7578-4E0D-A183-50C566CFCDA4}"/>
-              </a:ext>
-            </a:extLst>
-          </p:cNvPr>
-          <p:cNvSpPr txBox="1"/>
-          <p:nvPr/>
-        </p:nvSpPr>
-        <p:spPr>
-          <a:xfrm>
-            <a:off x="4295675" y="3227294"/>
-            <a:ext cx="4309621" cy="1384995"/>
-          </a:xfrm>
-          <a:prstGeom prst="rect">
-            <a:avLst/>
-          </a:prstGeom>
-          <a:noFill/>
-        </p:spPr>
-        <p:txBody>
-          <a:bodyPr wrap="square" rtlCol="0">
-            <a:spAutoFit/>
-          </a:bodyPr>
-          <a:lstStyle/>
-          <a:p>
-            <a:r>
-              <a:rPr lang="en-US" dirty="0">
-                <a:solidFill>
-                  <a:schemeClr val="bg1"/>
-                </a:solidFill>
-              </a:rPr>
-              <a:t>When China retaliated the first time on April 2, 2018, more stock prices were decreasing, showing that people were optimistic about China and Chinese manufacturers. There are more clusters of decreasing stocks. The pattern is that the more the cluster decreased, the more stocks in the cluster.</a:t>
-            </a:r>
-          </a:p>
-        </p:txBody>
-      </p:sp>
-    </p:spTree>
-    <p:extLst>
-      <p:ext uri="{BB962C8B-B14F-4D97-AF65-F5344CB8AC3E}">
-        <p14:creationId xmlns:p14="http://schemas.microsoft.com/office/powerpoint/2010/main" val="4025382183"/>
-      </p:ext>
-    </p:extLst>
-  </p:cSld>
-  <p:clrMapOvr>
-    <a:masterClrMapping/>
-  </p:clrMapOvr>
-</p:sld>
-</file>
-
-<file path=ppt/slides/slide11.xml><?xml version="1.0" encoding="utf-8"?>
-<p:sld xmlns:a="http://schemas.openxmlformats.org/drawingml/2006/main" xmlns:r="http://schemas.openxmlformats.org/officeDocument/2006/relationships" xmlns:p="http://schemas.openxmlformats.org/presentationml/2006/main">
-  <p:cSld>
-    <p:spTree>
-      <p:nvGrpSpPr>
-        <p:cNvPr id="1" name=""/>
-        <p:cNvGrpSpPr/>
-        <p:nvPr/>
-      </p:nvGrpSpPr>
-      <p:grpSpPr>
-        <a:xfrm>
-          <a:off x="0" y="0"/>
-          <a:ext cx="0" cy="0"/>
-          <a:chOff x="0" y="0"/>
-          <a:chExt cx="0" cy="0"/>
-        </a:xfrm>
-      </p:grpSpPr>
-      <p:sp>
-        <p:nvSpPr>
-          <p:cNvPr id="2" name="Title 1">
-            <a:extLst>
-              <a:ext uri="{FF2B5EF4-FFF2-40B4-BE49-F238E27FC236}">
-                <a16:creationId xmlns:a16="http://schemas.microsoft.com/office/drawing/2014/main" id="{2C9D0B24-EFC2-4E11-8D95-047EB8A55680}"/>
-              </a:ext>
-            </a:extLst>
-          </p:cNvPr>
-          <p:cNvSpPr>
-            <a:spLocks noGrp="1"/>
-          </p:cNvSpPr>
-          <p:nvPr>
-            <p:ph type="title"/>
-          </p:nvPr>
-        </p:nvSpPr>
-        <p:spPr>
-          <a:xfrm>
-            <a:off x="554638" y="381156"/>
-            <a:ext cx="7688400" cy="1071126"/>
-          </a:xfrm>
-        </p:spPr>
-        <p:txBody>
-          <a:bodyPr/>
-          <a:lstStyle/>
-          <a:p>
-            <a:r>
-              <a:rPr lang="en-US" sz="1800" dirty="0"/>
-              <a:t>Analyzing the three most positively influenced clusters when the U.S. decided to slap trade war against China on June 28, 2016</a:t>
-            </a:r>
-          </a:p>
-        </p:txBody>
-      </p:sp>
-      <p:pic>
-        <p:nvPicPr>
-          <p:cNvPr id="3" name="Picture 2">
-            <a:extLst>
-              <a:ext uri="{FF2B5EF4-FFF2-40B4-BE49-F238E27FC236}">
-                <a16:creationId xmlns:a16="http://schemas.microsoft.com/office/drawing/2014/main" id="{2A3F454E-2126-4502-82DB-30B00BFA1F4A}"/>
-              </a:ext>
-            </a:extLst>
-          </p:cNvPr>
-          <p:cNvPicPr>
-            <a:picLocks noChangeAspect="1"/>
-          </p:cNvPicPr>
-          <p:nvPr/>
-        </p:nvPicPr>
-        <p:blipFill>
-          <a:blip r:embed="rId2"/>
-          <a:stretch>
-            <a:fillRect/>
-          </a:stretch>
-        </p:blipFill>
-        <p:spPr>
-          <a:xfrm>
-            <a:off x="2483245" y="1452282"/>
-            <a:ext cx="3639627" cy="2438611"/>
-          </a:xfrm>
-          <a:prstGeom prst="rect">
-            <a:avLst/>
-          </a:prstGeom>
-        </p:spPr>
-      </p:pic>
-    </p:spTree>
-    <p:extLst>
-      <p:ext uri="{BB962C8B-B14F-4D97-AF65-F5344CB8AC3E}">
-        <p14:creationId xmlns:p14="http://schemas.microsoft.com/office/powerpoint/2010/main" val="3489746659"/>
-      </p:ext>
-    </p:extLst>
-  </p:cSld>
-  <p:clrMapOvr>
-    <a:masterClrMapping/>
-  </p:clrMapOvr>
-</p:sld>
-</file>
-
-<file path=ppt/slides/slide12.xml><?xml version="1.0" encoding="utf-8"?>
-<p:sld xmlns:a="http://schemas.openxmlformats.org/drawingml/2006/main" xmlns:r="http://schemas.openxmlformats.org/officeDocument/2006/relationships" xmlns:p="http://schemas.openxmlformats.org/presentationml/2006/main">
-  <p:cSld>
-    <p:spTree>
-      <p:nvGrpSpPr>
-        <p:cNvPr id="1" name=""/>
-        <p:cNvGrpSpPr/>
-        <p:nvPr/>
-      </p:nvGrpSpPr>
-      <p:grpSpPr>
-        <a:xfrm>
-          <a:off x="0" y="0"/>
-          <a:ext cx="0" cy="0"/>
-          <a:chOff x="0" y="0"/>
-          <a:chExt cx="0" cy="0"/>
-        </a:xfrm>
-      </p:grpSpPr>
-      <p:sp>
-        <p:nvSpPr>
-          <p:cNvPr id="2" name="Title 1">
-            <a:extLst>
-              <a:ext uri="{FF2B5EF4-FFF2-40B4-BE49-F238E27FC236}">
-                <a16:creationId xmlns:a16="http://schemas.microsoft.com/office/drawing/2014/main" id="{F4DA8CC6-8D40-4690-A162-0BD13F347D82}"/>
-              </a:ext>
-            </a:extLst>
-          </p:cNvPr>
-          <p:cNvSpPr>
-            <a:spLocks noGrp="1"/>
-          </p:cNvSpPr>
-          <p:nvPr>
-            <p:ph type="title"/>
-          </p:nvPr>
-        </p:nvSpPr>
-        <p:spPr>
-          <a:xfrm>
-            <a:off x="662214" y="287027"/>
-            <a:ext cx="7688400" cy="849249"/>
-          </a:xfrm>
-        </p:spPr>
-        <p:txBody>
-          <a:bodyPr/>
-          <a:lstStyle/>
-          <a:p>
-            <a:r>
-              <a:rPr lang="en-US" dirty="0"/>
-              <a:t>1</a:t>
-            </a:r>
-            <a:r>
-              <a:rPr lang="en-US" baseline="30000" dirty="0"/>
-              <a:t>st</a:t>
-            </a:r>
-            <a:r>
-              <a:rPr lang="en-US" dirty="0"/>
-              <a:t> cluster</a:t>
-            </a:r>
-          </a:p>
-        </p:txBody>
-      </p:sp>
-      <p:sp>
-        <p:nvSpPr>
-          <p:cNvPr id="4" name="TextBox 3">
-            <a:extLst>
-              <a:ext uri="{FF2B5EF4-FFF2-40B4-BE49-F238E27FC236}">
-                <a16:creationId xmlns:a16="http://schemas.microsoft.com/office/drawing/2014/main" id="{42244D65-D82C-4A15-8841-205412FD819D}"/>
-              </a:ext>
-            </a:extLst>
-          </p:cNvPr>
-          <p:cNvSpPr txBox="1"/>
-          <p:nvPr/>
-        </p:nvSpPr>
-        <p:spPr>
-          <a:xfrm>
-            <a:off x="5244353" y="1902759"/>
-            <a:ext cx="3576918" cy="1169551"/>
-          </a:xfrm>
-          <a:prstGeom prst="rect">
-            <a:avLst/>
-          </a:prstGeom>
-          <a:noFill/>
-        </p:spPr>
-        <p:txBody>
-          <a:bodyPr wrap="square" rtlCol="0">
-            <a:spAutoFit/>
-          </a:bodyPr>
-          <a:lstStyle/>
-          <a:p>
-            <a:r>
-              <a:rPr lang="en-US" dirty="0">
-                <a:solidFill>
-                  <a:schemeClr val="bg1"/>
-                </a:solidFill>
-              </a:rPr>
-              <a:t>The top four industries :</a:t>
-            </a:r>
-          </a:p>
-          <a:p>
-            <a:pPr marL="285750" indent="-285750">
-              <a:buFont typeface="Arial" panose="020B0604020202020204" pitchFamily="34" charset="0"/>
-              <a:buChar char="•"/>
-            </a:pPr>
-            <a:r>
-              <a:rPr lang="en-US" dirty="0">
-                <a:solidFill>
-                  <a:schemeClr val="bg1"/>
-                </a:solidFill>
-              </a:rPr>
-              <a:t>major pharmaceuticals (58) </a:t>
-            </a:r>
-          </a:p>
-          <a:p>
-            <a:pPr marL="285750" indent="-285750">
-              <a:buFont typeface="Arial" panose="020B0604020202020204" pitchFamily="34" charset="0"/>
-              <a:buChar char="•"/>
-            </a:pPr>
-            <a:r>
-              <a:rPr lang="en-US" dirty="0">
-                <a:solidFill>
-                  <a:schemeClr val="bg1"/>
-                </a:solidFill>
-              </a:rPr>
-              <a:t>major banks (38)</a:t>
-            </a:r>
-          </a:p>
-          <a:p>
-            <a:pPr marL="285750" indent="-285750">
-              <a:buFont typeface="Arial" panose="020B0604020202020204" pitchFamily="34" charset="0"/>
-              <a:buChar char="•"/>
-            </a:pPr>
-            <a:r>
-              <a:rPr lang="en-US" dirty="0">
-                <a:solidFill>
-                  <a:schemeClr val="bg1"/>
-                </a:solidFill>
-              </a:rPr>
-              <a:t>Real estate investment (29)</a:t>
-            </a:r>
-          </a:p>
-          <a:p>
-            <a:pPr marL="285750" indent="-285750">
-              <a:buFont typeface="Arial" panose="020B0604020202020204" pitchFamily="34" charset="0"/>
-              <a:buChar char="•"/>
-            </a:pPr>
-            <a:r>
-              <a:rPr lang="en-US" dirty="0">
-                <a:solidFill>
-                  <a:schemeClr val="bg1"/>
-                </a:solidFill>
-              </a:rPr>
-              <a:t>oil &amp; gas (23)</a:t>
-            </a:r>
-          </a:p>
-        </p:txBody>
-      </p:sp>
-      <p:pic>
-        <p:nvPicPr>
-          <p:cNvPr id="5" name="Picture 4">
-            <a:extLst>
-              <a:ext uri="{FF2B5EF4-FFF2-40B4-BE49-F238E27FC236}">
-                <a16:creationId xmlns:a16="http://schemas.microsoft.com/office/drawing/2014/main" id="{84B70490-5192-4B74-9054-C6DDACBBF6DF}"/>
-              </a:ext>
-            </a:extLst>
-          </p:cNvPr>
-          <p:cNvPicPr>
-            <a:picLocks noChangeAspect="1"/>
-          </p:cNvPicPr>
-          <p:nvPr/>
-        </p:nvPicPr>
-        <p:blipFill>
-          <a:blip r:embed="rId2"/>
-          <a:stretch>
-            <a:fillRect/>
-          </a:stretch>
-        </p:blipFill>
-        <p:spPr>
-          <a:xfrm>
-            <a:off x="282390" y="1357742"/>
-            <a:ext cx="4787152" cy="3498731"/>
-          </a:xfrm>
-          <a:prstGeom prst="rect">
-            <a:avLst/>
-          </a:prstGeom>
-        </p:spPr>
-      </p:pic>
-    </p:spTree>
-    <p:extLst>
-      <p:ext uri="{BB962C8B-B14F-4D97-AF65-F5344CB8AC3E}">
-        <p14:creationId xmlns:p14="http://schemas.microsoft.com/office/powerpoint/2010/main" val="4014298962"/>
-      </p:ext>
-    </p:extLst>
-  </p:cSld>
-  <p:clrMapOvr>
-    <a:masterClrMapping/>
-  </p:clrMapOvr>
-</p:sld>
-</file>
-
-<file path=ppt/slides/slide13.xml><?xml version="1.0" encoding="utf-8"?>
-<p:sld xmlns:a="http://schemas.openxmlformats.org/drawingml/2006/main" xmlns:r="http://schemas.openxmlformats.org/officeDocument/2006/relationships" xmlns:p="http://schemas.openxmlformats.org/presentationml/2006/main">
-  <p:cSld>
-    <p:spTree>
-      <p:nvGrpSpPr>
-        <p:cNvPr id="1" name=""/>
-        <p:cNvGrpSpPr/>
-        <p:nvPr/>
-      </p:nvGrpSpPr>
-      <p:grpSpPr>
-        <a:xfrm>
-          <a:off x="0" y="0"/>
-          <a:ext cx="0" cy="0"/>
-          <a:chOff x="0" y="0"/>
-          <a:chExt cx="0" cy="0"/>
-        </a:xfrm>
-      </p:grpSpPr>
-      <p:sp>
-        <p:nvSpPr>
-          <p:cNvPr id="2" name="Title 1">
-            <a:extLst>
-              <a:ext uri="{FF2B5EF4-FFF2-40B4-BE49-F238E27FC236}">
                 <a16:creationId xmlns:a16="http://schemas.microsoft.com/office/drawing/2014/main" id="{6869FDC9-72DA-4CF8-9C9B-29DA58710C32}"/>
               </a:ext>
             </a:extLst>
@@ -11085,7 +10590,7 @@
 </p:sld>
 </file>
 
-<file path=ppt/slides/slide14.xml><?xml version="1.0" encoding="utf-8"?>
+<file path=ppt/slides/slide11.xml><?xml version="1.0" encoding="utf-8"?>
 <p:sld xmlns:a="http://schemas.openxmlformats.org/drawingml/2006/main" xmlns:r="http://schemas.openxmlformats.org/officeDocument/2006/relationships" xmlns:p="http://schemas.openxmlformats.org/presentationml/2006/main">
   <p:cSld>
     <p:spTree>
@@ -11281,7 +10786,7 @@
 </p:sld>
 </file>
 
-<file path=ppt/slides/slide15.xml><?xml version="1.0" encoding="utf-8"?>
+<file path=ppt/slides/slide12.xml><?xml version="1.0" encoding="utf-8"?>
 <p:sld xmlns:a="http://schemas.openxmlformats.org/drawingml/2006/main" xmlns:r="http://schemas.openxmlformats.org/officeDocument/2006/relationships" xmlns:p="http://schemas.openxmlformats.org/presentationml/2006/main">
   <p:cSld>
     <p:spTree>
@@ -11374,7 +10879,7 @@
 </p:sld>
 </file>
 
-<file path=ppt/slides/slide16.xml><?xml version="1.0" encoding="utf-8"?>
+<file path=ppt/slides/slide13.xml><?xml version="1.0" encoding="utf-8"?>
 <p:sld xmlns:a="http://schemas.openxmlformats.org/drawingml/2006/main" xmlns:r="http://schemas.openxmlformats.org/officeDocument/2006/relationships" xmlns:p="http://schemas.openxmlformats.org/presentationml/2006/main">
   <p:cSld>
     <p:spTree>
@@ -11570,7 +11075,7 @@
 </p:sld>
 </file>
 
-<file path=ppt/slides/slide17.xml><?xml version="1.0" encoding="utf-8"?>
+<file path=ppt/slides/slide14.xml><?xml version="1.0" encoding="utf-8"?>
 <p:sld xmlns:a="http://schemas.openxmlformats.org/drawingml/2006/main" xmlns:r="http://schemas.openxmlformats.org/officeDocument/2006/relationships" xmlns:p="http://schemas.openxmlformats.org/presentationml/2006/main">
   <p:cSld>
     <p:spTree>
@@ -11766,7 +11271,7 @@
 </p:sld>
 </file>
 
-<file path=ppt/slides/slide18.xml><?xml version="1.0" encoding="utf-8"?>
+<file path=ppt/slides/slide15.xml><?xml version="1.0" encoding="utf-8"?>
 <p:sld xmlns:a="http://schemas.openxmlformats.org/drawingml/2006/main" xmlns:r="http://schemas.openxmlformats.org/officeDocument/2006/relationships" xmlns:p="http://schemas.openxmlformats.org/presentationml/2006/main">
   <p:cSld>
     <p:spTree>
@@ -11962,7 +11467,7 @@
 </p:sld>
 </file>
 
-<file path=ppt/slides/slide19.xml><?xml version="1.0" encoding="utf-8"?>
+<file path=ppt/slides/slide16.xml><?xml version="1.0" encoding="utf-8"?>
 <p:sld xmlns:a="http://schemas.openxmlformats.org/drawingml/2006/main" xmlns:r="http://schemas.openxmlformats.org/officeDocument/2006/relationships" xmlns:p="http://schemas.openxmlformats.org/presentationml/2006/main">
   <p:cSld>
     <p:spTree>
@@ -12340,62 +11845,7 @@
 </p:sld>
 </file>
 
-<file path=ppt/slides/slide2.xml><?xml version="1.0" encoding="utf-8"?>
-<p:sld xmlns:a="http://schemas.openxmlformats.org/drawingml/2006/main" xmlns:r="http://schemas.openxmlformats.org/officeDocument/2006/relationships" xmlns:p="http://schemas.openxmlformats.org/presentationml/2006/main">
-  <p:cSld>
-    <p:spTree>
-      <p:nvGrpSpPr>
-        <p:cNvPr id="1" name=""/>
-        <p:cNvGrpSpPr/>
-        <p:nvPr/>
-      </p:nvGrpSpPr>
-      <p:grpSpPr>
-        <a:xfrm>
-          <a:off x="0" y="0"/>
-          <a:ext cx="0" cy="0"/>
-          <a:chOff x="0" y="0"/>
-          <a:chExt cx="0" cy="0"/>
-        </a:xfrm>
-      </p:grpSpPr>
-      <p:sp>
-        <p:nvSpPr>
-          <p:cNvPr id="2" name="Title 1">
-            <a:extLst>
-              <a:ext uri="{FF2B5EF4-FFF2-40B4-BE49-F238E27FC236}">
-                <a16:creationId xmlns:a16="http://schemas.microsoft.com/office/drawing/2014/main" id="{7EAC8A17-052D-43B1-989F-1F6E871C1B0D}"/>
-              </a:ext>
-            </a:extLst>
-          </p:cNvPr>
-          <p:cNvSpPr>
-            <a:spLocks noGrp="1"/>
-          </p:cNvSpPr>
-          <p:nvPr>
-            <p:ph type="title"/>
-          </p:nvPr>
-        </p:nvSpPr>
-        <p:spPr/>
-        <p:txBody>
-          <a:bodyPr/>
-          <a:lstStyle/>
-          <a:p>
-            <a:endParaRPr lang="en-US"/>
-          </a:p>
-        </p:txBody>
-      </p:sp>
-    </p:spTree>
-    <p:extLst>
-      <p:ext uri="{BB962C8B-B14F-4D97-AF65-F5344CB8AC3E}">
-        <p14:creationId xmlns:p14="http://schemas.microsoft.com/office/powerpoint/2010/main" val="40088665"/>
-      </p:ext>
-    </p:extLst>
-  </p:cSld>
-  <p:clrMapOvr>
-    <a:masterClrMapping/>
-  </p:clrMapOvr>
-</p:sld>
-</file>
-
-<file path=ppt/slides/slide20.xml><?xml version="1.0" encoding="utf-8"?>
+<file path=ppt/slides/slide17.xml><?xml version="1.0" encoding="utf-8"?>
 <p:sld xmlns:a="http://schemas.openxmlformats.org/drawingml/2006/main" xmlns:r="http://schemas.openxmlformats.org/officeDocument/2006/relationships" xmlns:p="http://schemas.openxmlformats.org/presentationml/2006/main">
   <p:cSld>
     <p:spTree>
@@ -12568,87 +12018,7 @@
 </p:sld>
 </file>
 
-<file path=ppt/slides/slide3.xml><?xml version="1.0" encoding="utf-8"?>
-<p:sld xmlns:a="http://schemas.openxmlformats.org/drawingml/2006/main" xmlns:r="http://schemas.openxmlformats.org/officeDocument/2006/relationships" xmlns:p="http://schemas.openxmlformats.org/presentationml/2006/main">
-  <p:cSld>
-    <p:spTree>
-      <p:nvGrpSpPr>
-        <p:cNvPr id="1" name=""/>
-        <p:cNvGrpSpPr/>
-        <p:nvPr/>
-      </p:nvGrpSpPr>
-      <p:grpSpPr>
-        <a:xfrm>
-          <a:off x="0" y="0"/>
-          <a:ext cx="0" cy="0"/>
-          <a:chOff x="0" y="0"/>
-          <a:chExt cx="0" cy="0"/>
-        </a:xfrm>
-      </p:grpSpPr>
-      <p:sp>
-        <p:nvSpPr>
-          <p:cNvPr id="2" name="Title 1">
-            <a:extLst>
-              <a:ext uri="{FF2B5EF4-FFF2-40B4-BE49-F238E27FC236}">
-                <a16:creationId xmlns:a16="http://schemas.microsoft.com/office/drawing/2014/main" id="{C414FC7E-9975-4349-87FD-3E9EAD30DA45}"/>
-              </a:ext>
-            </a:extLst>
-          </p:cNvPr>
-          <p:cNvSpPr>
-            <a:spLocks noGrp="1"/>
-          </p:cNvSpPr>
-          <p:nvPr>
-            <p:ph type="title"/>
-          </p:nvPr>
-        </p:nvSpPr>
-        <p:spPr/>
-        <p:txBody>
-          <a:bodyPr/>
-          <a:lstStyle/>
-          <a:p>
-            <a:endParaRPr lang="en-US" dirty="0"/>
-          </a:p>
-        </p:txBody>
-      </p:sp>
-      <p:sp>
-        <p:nvSpPr>
-          <p:cNvPr id="3" name="Text Placeholder 2">
-            <a:extLst>
-              <a:ext uri="{FF2B5EF4-FFF2-40B4-BE49-F238E27FC236}">
-                <a16:creationId xmlns:a16="http://schemas.microsoft.com/office/drawing/2014/main" id="{49542258-6272-4D56-B9B0-8F374FFB8DE5}"/>
-              </a:ext>
-            </a:extLst>
-          </p:cNvPr>
-          <p:cNvSpPr>
-            <a:spLocks noGrp="1"/>
-          </p:cNvSpPr>
-          <p:nvPr>
-            <p:ph type="body" idx="1"/>
-          </p:nvPr>
-        </p:nvSpPr>
-        <p:spPr/>
-        <p:txBody>
-          <a:bodyPr/>
-          <a:lstStyle/>
-          <a:p>
-            <a:endParaRPr lang="en-US"/>
-          </a:p>
-        </p:txBody>
-      </p:sp>
-    </p:spTree>
-    <p:extLst>
-      <p:ext uri="{BB962C8B-B14F-4D97-AF65-F5344CB8AC3E}">
-        <p14:creationId xmlns:p14="http://schemas.microsoft.com/office/powerpoint/2010/main" val="1363995413"/>
-      </p:ext>
-    </p:extLst>
-  </p:cSld>
-  <p:clrMapOvr>
-    <a:masterClrMapping/>
-  </p:clrMapOvr>
-</p:sld>
-</file>
-
-<file path=ppt/slides/slide4.xml><?xml version="1.0" encoding="utf-8"?>
+<file path=ppt/slides/slide2.xml><?xml version="1.0" encoding="utf-8"?>
 <p:sld xmlns:a="http://schemas.openxmlformats.org/drawingml/2006/main" xmlns:r="http://schemas.openxmlformats.org/officeDocument/2006/relationships" xmlns:p="http://schemas.openxmlformats.org/presentationml/2006/main">
   <p:cSld>
     <p:spTree>
@@ -13217,87 +12587,7 @@
 </p:sld>
 </file>
 
-<file path=ppt/slides/slide5.xml><?xml version="1.0" encoding="utf-8"?>
-<p:sld xmlns:a="http://schemas.openxmlformats.org/drawingml/2006/main" xmlns:r="http://schemas.openxmlformats.org/officeDocument/2006/relationships" xmlns:p="http://schemas.openxmlformats.org/presentationml/2006/main">
-  <p:cSld>
-    <p:spTree>
-      <p:nvGrpSpPr>
-        <p:cNvPr id="1" name=""/>
-        <p:cNvGrpSpPr/>
-        <p:nvPr/>
-      </p:nvGrpSpPr>
-      <p:grpSpPr>
-        <a:xfrm>
-          <a:off x="0" y="0"/>
-          <a:ext cx="0" cy="0"/>
-          <a:chOff x="0" y="0"/>
-          <a:chExt cx="0" cy="0"/>
-        </a:xfrm>
-      </p:grpSpPr>
-      <p:sp>
-        <p:nvSpPr>
-          <p:cNvPr id="2" name="Title 1">
-            <a:extLst>
-              <a:ext uri="{FF2B5EF4-FFF2-40B4-BE49-F238E27FC236}">
-                <a16:creationId xmlns:a16="http://schemas.microsoft.com/office/drawing/2014/main" id="{2C961AC7-533D-4C4A-96D9-5891C194C05C}"/>
-              </a:ext>
-            </a:extLst>
-          </p:cNvPr>
-          <p:cNvSpPr>
-            <a:spLocks noGrp="1"/>
-          </p:cNvSpPr>
-          <p:nvPr>
-            <p:ph type="title"/>
-          </p:nvPr>
-        </p:nvSpPr>
-        <p:spPr/>
-        <p:txBody>
-          <a:bodyPr/>
-          <a:lstStyle/>
-          <a:p>
-            <a:endParaRPr lang="en-US"/>
-          </a:p>
-        </p:txBody>
-      </p:sp>
-      <p:sp>
-        <p:nvSpPr>
-          <p:cNvPr id="3" name="Text Placeholder 2">
-            <a:extLst>
-              <a:ext uri="{FF2B5EF4-FFF2-40B4-BE49-F238E27FC236}">
-                <a16:creationId xmlns:a16="http://schemas.microsoft.com/office/drawing/2014/main" id="{F18F7070-7F42-49FA-9AF3-3A9044AB8534}"/>
-              </a:ext>
-            </a:extLst>
-          </p:cNvPr>
-          <p:cNvSpPr>
-            <a:spLocks noGrp="1"/>
-          </p:cNvSpPr>
-          <p:nvPr>
-            <p:ph type="body" idx="1"/>
-          </p:nvPr>
-        </p:nvSpPr>
-        <p:spPr/>
-        <p:txBody>
-          <a:bodyPr numCol="2"/>
-          <a:lstStyle/>
-          <a:p>
-            <a:endParaRPr lang="en-US" dirty="0"/>
-          </a:p>
-        </p:txBody>
-      </p:sp>
-    </p:spTree>
-    <p:extLst>
-      <p:ext uri="{BB962C8B-B14F-4D97-AF65-F5344CB8AC3E}">
-        <p14:creationId xmlns:p14="http://schemas.microsoft.com/office/powerpoint/2010/main" val="4247114923"/>
-      </p:ext>
-    </p:extLst>
-  </p:cSld>
-  <p:clrMapOvr>
-    <a:masterClrMapping/>
-  </p:clrMapOvr>
-</p:sld>
-</file>
-
-<file path=ppt/slides/slide6.xml><?xml version="1.0" encoding="utf-8"?>
+<file path=ppt/slides/slide3.xml><?xml version="1.0" encoding="utf-8"?>
 <p:sld xmlns:a="http://schemas.openxmlformats.org/drawingml/2006/main" xmlns:r="http://schemas.openxmlformats.org/officeDocument/2006/relationships" xmlns:p="http://schemas.openxmlformats.org/presentationml/2006/main">
   <p:cSld>
     <p:spTree>
@@ -13384,7 +12674,7 @@
 </p:sld>
 </file>
 
-<file path=ppt/slides/slide7.xml><?xml version="1.0" encoding="utf-8"?>
+<file path=ppt/slides/slide4.xml><?xml version="1.0" encoding="utf-8"?>
 <p:sld xmlns:a="http://schemas.openxmlformats.org/drawingml/2006/main" xmlns:r="http://schemas.openxmlformats.org/officeDocument/2006/relationships" xmlns:p="http://schemas.openxmlformats.org/presentationml/2006/main">
   <p:cSld>
     <p:spTree>
@@ -13500,7 +12790,7 @@
               <a:buChar char="●"/>
             </a:pPr>
             <a:r>
-              <a:rPr lang="en-US" sz="1300" b="0" i="0" u="none" strike="noStrike" cap="none" dirty="0">
+              <a:rPr lang="en-US" sz="1800" b="0" i="0" u="none" strike="noStrike" cap="none" dirty="0">
                 <a:solidFill>
                   <a:schemeClr val="lt1"/>
                 </a:solidFill>
@@ -13526,7 +12816,7 @@
               <a:buSzPts val="1300"/>
             </a:pPr>
             <a:r>
-              <a:rPr lang="en-US" sz="1300" dirty="0">
+              <a:rPr lang="en-US" sz="1800" dirty="0">
                 <a:solidFill>
                   <a:schemeClr val="lt1"/>
                 </a:solidFill>
@@ -13554,7 +12844,7 @@
               <a:buChar char="●"/>
             </a:pPr>
             <a:r>
-              <a:rPr lang="en-US" sz="1300" b="0" i="0" u="none" strike="noStrike" cap="none" dirty="0">
+              <a:rPr lang="en-US" sz="1800" b="0" i="0" u="none" strike="noStrike" cap="none" dirty="0">
                 <a:solidFill>
                   <a:schemeClr val="lt1"/>
                 </a:solidFill>
@@ -13566,7 +12856,7 @@
               <a:t>Sorted out stocks </a:t>
             </a:r>
             <a:r>
-              <a:rPr lang="en-US" sz="1300" dirty="0">
+              <a:rPr lang="en-US" sz="1800" dirty="0">
                 <a:solidFill>
                   <a:schemeClr val="lt1"/>
                 </a:solidFill>
@@ -13577,7 +12867,7 @@
               </a:rPr>
               <a:t>registered before June 28, 2016 and closed after October 7, 2019 </a:t>
             </a:r>
-            <a:endParaRPr lang="en-US" sz="1300" b="0" i="0" u="none" strike="noStrike" cap="none" dirty="0">
+            <a:endParaRPr lang="en-US" sz="1800" b="0" i="0" u="none" strike="noStrike" cap="none" dirty="0">
               <a:solidFill>
                 <a:schemeClr val="lt1"/>
               </a:solidFill>
@@ -13602,7 +12892,7 @@
               <a:buFont typeface="Lato"/>
               <a:buChar char="●"/>
             </a:pPr>
-            <a:endParaRPr lang="en-US" sz="1300" b="0" i="0" u="none" strike="noStrike" cap="none" dirty="0">
+            <a:endParaRPr lang="en-US" sz="1800" b="0" i="0" u="none" strike="noStrike" cap="none" dirty="0">
               <a:solidFill>
                 <a:schemeClr val="lt1"/>
               </a:solidFill>
@@ -13627,7 +12917,7 @@
               <a:buFont typeface="Lato"/>
               <a:buChar char="●"/>
             </a:pPr>
-            <a:endParaRPr lang="en-US" sz="1300" b="0" i="0" u="none" strike="noStrike" cap="none" dirty="0">
+            <a:endParaRPr lang="en-US" sz="1800" b="0" i="0" u="none" strike="noStrike" cap="none" dirty="0">
               <a:solidFill>
                 <a:schemeClr val="lt1"/>
               </a:solidFill>
@@ -13652,7 +12942,7 @@
               <a:buFont typeface="Lato"/>
               <a:buChar char="●"/>
             </a:pPr>
-            <a:endParaRPr lang="en-US" sz="1300" b="0" i="0" u="none" strike="noStrike" cap="none" dirty="0">
+            <a:endParaRPr lang="en-US" sz="1800" b="0" i="0" u="none" strike="noStrike" cap="none" dirty="0">
               <a:solidFill>
                 <a:schemeClr val="lt1"/>
               </a:solidFill>
@@ -13697,7 +12987,7 @@
 </p:sld>
 </file>
 
-<file path=ppt/slides/slide8.xml><?xml version="1.0" encoding="utf-8"?>
+<file path=ppt/slides/slide5.xml><?xml version="1.0" encoding="utf-8"?>
 <p:sld xmlns:a="http://schemas.openxmlformats.org/drawingml/2006/main" xmlns:r="http://schemas.openxmlformats.org/officeDocument/2006/relationships" xmlns:p="http://schemas.openxmlformats.org/presentationml/2006/main">
   <p:cSld>
     <p:spTree>
@@ -13873,7 +13163,7 @@
 </p:sld>
 </file>
 
-<file path=ppt/slides/slide9.xml><?xml version="1.0" encoding="utf-8"?>
+<file path=ppt/slides/slide6.xml><?xml version="1.0" encoding="utf-8"?>
 <p:sld xmlns:a="http://schemas.openxmlformats.org/drawingml/2006/main" xmlns:r="http://schemas.openxmlformats.org/officeDocument/2006/relationships" xmlns:p="http://schemas.openxmlformats.org/presentationml/2006/main">
   <p:cSld>
     <p:spTree>
@@ -13956,6 +13246,9 @@
           <a:bodyPr/>
           <a:lstStyle/>
           <a:p>
+            <a:pPr marL="146050" indent="0">
+              <a:buNone/>
+            </a:pPr>
             <a:r>
               <a:rPr lang="en-US" dirty="0"/>
               <a:t>The clustering result is similar to the industry classification of the stock market</a:t>
@@ -18165,6 +17458,498 @@
 </p:sld>
 </file>
 
+<file path=ppt/slides/slide7.xml><?xml version="1.0" encoding="utf-8"?>
+<p:sld xmlns:a="http://schemas.openxmlformats.org/drawingml/2006/main" xmlns:r="http://schemas.openxmlformats.org/officeDocument/2006/relationships" xmlns:p="http://schemas.openxmlformats.org/presentationml/2006/main">
+  <p:cSld>
+    <p:spTree>
+      <p:nvGrpSpPr>
+        <p:cNvPr id="1" name=""/>
+        <p:cNvGrpSpPr/>
+        <p:nvPr/>
+      </p:nvGrpSpPr>
+      <p:grpSpPr>
+        <a:xfrm>
+          <a:off x="0" y="0"/>
+          <a:ext cx="0" cy="0"/>
+          <a:chOff x="0" y="0"/>
+          <a:chExt cx="0" cy="0"/>
+        </a:xfrm>
+      </p:grpSpPr>
+      <p:sp>
+        <p:nvSpPr>
+          <p:cNvPr id="2" name="Title 1">
+            <a:extLst>
+              <a:ext uri="{FF2B5EF4-FFF2-40B4-BE49-F238E27FC236}">
+                <a16:creationId xmlns:a16="http://schemas.microsoft.com/office/drawing/2014/main" id="{A2373D7E-181B-49EE-A5DA-300CFD2B90BB}"/>
+              </a:ext>
+            </a:extLst>
+          </p:cNvPr>
+          <p:cNvSpPr>
+            <a:spLocks noGrp="1"/>
+          </p:cNvSpPr>
+          <p:nvPr>
+            <p:ph type="title"/>
+          </p:nvPr>
+        </p:nvSpPr>
+        <p:spPr>
+          <a:xfrm>
+            <a:off x="506085" y="93943"/>
+            <a:ext cx="7688400" cy="1518600"/>
+          </a:xfrm>
+        </p:spPr>
+        <p:txBody>
+          <a:bodyPr/>
+          <a:lstStyle/>
+          <a:p>
+            <a:r>
+              <a:rPr lang="en-US" sz="2000" dirty="0"/>
+              <a:t>Relationship between the price fluctuation of each cluster and the number of stocks of each cluster</a:t>
+            </a:r>
+          </a:p>
+        </p:txBody>
+      </p:sp>
+      <p:pic>
+        <p:nvPicPr>
+          <p:cNvPr id="3" name="Picture 2">
+            <a:extLst>
+              <a:ext uri="{FF2B5EF4-FFF2-40B4-BE49-F238E27FC236}">
+                <a16:creationId xmlns:a16="http://schemas.microsoft.com/office/drawing/2014/main" id="{17BD36A1-04AF-4BC1-ACC8-83E9FAB24F85}"/>
+              </a:ext>
+            </a:extLst>
+          </p:cNvPr>
+          <p:cNvPicPr>
+            <a:picLocks noChangeAspect="1"/>
+          </p:cNvPicPr>
+          <p:nvPr/>
+        </p:nvPicPr>
+        <p:blipFill>
+          <a:blip r:embed="rId2"/>
+          <a:stretch>
+            <a:fillRect/>
+          </a:stretch>
+        </p:blipFill>
+        <p:spPr>
+          <a:xfrm>
+            <a:off x="785944" y="1057469"/>
+            <a:ext cx="2864675" cy="3846365"/>
+          </a:xfrm>
+          <a:prstGeom prst="rect">
+            <a:avLst/>
+          </a:prstGeom>
+        </p:spPr>
+      </p:pic>
+      <p:sp>
+        <p:nvSpPr>
+          <p:cNvPr id="4" name="TextBox 3">
+            <a:extLst>
+              <a:ext uri="{FF2B5EF4-FFF2-40B4-BE49-F238E27FC236}">
+                <a16:creationId xmlns:a16="http://schemas.microsoft.com/office/drawing/2014/main" id="{B4D247F8-FC1D-4DF7-94F0-0D6622943EFC}"/>
+              </a:ext>
+            </a:extLst>
+          </p:cNvPr>
+          <p:cNvSpPr txBox="1"/>
+          <p:nvPr/>
+        </p:nvSpPr>
+        <p:spPr>
+          <a:xfrm>
+            <a:off x="4350285" y="1144745"/>
+            <a:ext cx="4200402" cy="1169551"/>
+          </a:xfrm>
+          <a:prstGeom prst="rect">
+            <a:avLst/>
+          </a:prstGeom>
+          <a:noFill/>
+        </p:spPr>
+        <p:txBody>
+          <a:bodyPr wrap="square" rtlCol="0">
+            <a:spAutoFit/>
+          </a:bodyPr>
+          <a:lstStyle/>
+          <a:p>
+            <a:r>
+              <a:rPr lang="en-US" dirty="0">
+                <a:solidFill>
+                  <a:schemeClr val="bg1"/>
+                </a:solidFill>
+              </a:rPr>
+              <a:t>When the U.S. firstly planned to counter unfair trade from China on June 28, 2016, more stock prices were increasing. There are more clusters of rising stocks. This pattern indicates that people had the confidence for</a:t>
+            </a:r>
+            <a:r>
+              <a:rPr lang="zh-CN" altLang="en-US" dirty="0">
+                <a:solidFill>
+                  <a:schemeClr val="bg1"/>
+                </a:solidFill>
+              </a:rPr>
+              <a:t> </a:t>
+            </a:r>
+            <a:r>
+              <a:rPr lang="en-US" altLang="zh-CN" dirty="0">
+                <a:solidFill>
+                  <a:schemeClr val="bg1"/>
+                </a:solidFill>
+              </a:rPr>
+              <a:t>US</a:t>
+            </a:r>
+            <a:r>
+              <a:rPr lang="zh-CN" altLang="en-US" dirty="0">
+                <a:solidFill>
+                  <a:schemeClr val="bg1"/>
+                </a:solidFill>
+              </a:rPr>
+              <a:t> </a:t>
+            </a:r>
+            <a:r>
+              <a:rPr lang="en-US" dirty="0">
+                <a:solidFill>
+                  <a:schemeClr val="bg1"/>
+                </a:solidFill>
+              </a:rPr>
+              <a:t>winning the Trade War. </a:t>
+            </a:r>
+          </a:p>
+        </p:txBody>
+      </p:sp>
+      <p:sp>
+        <p:nvSpPr>
+          <p:cNvPr id="5" name="TextBox 4">
+            <a:extLst>
+              <a:ext uri="{FF2B5EF4-FFF2-40B4-BE49-F238E27FC236}">
+                <a16:creationId xmlns:a16="http://schemas.microsoft.com/office/drawing/2014/main" id="{906026C9-7578-4E0D-A183-50C566CFCDA4}"/>
+              </a:ext>
+            </a:extLst>
+          </p:cNvPr>
+          <p:cNvSpPr txBox="1"/>
+          <p:nvPr/>
+        </p:nvSpPr>
+        <p:spPr>
+          <a:xfrm>
+            <a:off x="4295675" y="3227294"/>
+            <a:ext cx="4309621" cy="1384995"/>
+          </a:xfrm>
+          <a:prstGeom prst="rect">
+            <a:avLst/>
+          </a:prstGeom>
+          <a:noFill/>
+        </p:spPr>
+        <p:txBody>
+          <a:bodyPr wrap="square" rtlCol="0">
+            <a:spAutoFit/>
+          </a:bodyPr>
+          <a:lstStyle/>
+          <a:p>
+            <a:r>
+              <a:rPr lang="en-US" dirty="0">
+                <a:solidFill>
+                  <a:schemeClr val="bg1"/>
+                </a:solidFill>
+              </a:rPr>
+              <a:t>When China retaliated the first time on April 2, 2018, more stock prices were decreasing, showing that people were optimistic about China and Chinese manufacturers. There are more clusters of decreasing stocks. The pattern is that the more the cluster decreased, the more stocks in the cluster.</a:t>
+            </a:r>
+          </a:p>
+        </p:txBody>
+      </p:sp>
+    </p:spTree>
+    <p:extLst>
+      <p:ext uri="{BB962C8B-B14F-4D97-AF65-F5344CB8AC3E}">
+        <p14:creationId xmlns:p14="http://schemas.microsoft.com/office/powerpoint/2010/main" val="4025382183"/>
+      </p:ext>
+    </p:extLst>
+  </p:cSld>
+  <p:clrMapOvr>
+    <a:masterClrMapping/>
+  </p:clrMapOvr>
+</p:sld>
+</file>
+
+<file path=ppt/slides/slide8.xml><?xml version="1.0" encoding="utf-8"?>
+<p:sld xmlns:a="http://schemas.openxmlformats.org/drawingml/2006/main" xmlns:r="http://schemas.openxmlformats.org/officeDocument/2006/relationships" xmlns:p="http://schemas.openxmlformats.org/presentationml/2006/main">
+  <p:cSld>
+    <p:spTree>
+      <p:nvGrpSpPr>
+        <p:cNvPr id="1" name=""/>
+        <p:cNvGrpSpPr/>
+        <p:nvPr/>
+      </p:nvGrpSpPr>
+      <p:grpSpPr>
+        <a:xfrm>
+          <a:off x="0" y="0"/>
+          <a:ext cx="0" cy="0"/>
+          <a:chOff x="0" y="0"/>
+          <a:chExt cx="0" cy="0"/>
+        </a:xfrm>
+      </p:grpSpPr>
+      <p:sp>
+        <p:nvSpPr>
+          <p:cNvPr id="2" name="Title 1">
+            <a:extLst>
+              <a:ext uri="{FF2B5EF4-FFF2-40B4-BE49-F238E27FC236}">
+                <a16:creationId xmlns:a16="http://schemas.microsoft.com/office/drawing/2014/main" id="{2C9D0B24-EFC2-4E11-8D95-047EB8A55680}"/>
+              </a:ext>
+            </a:extLst>
+          </p:cNvPr>
+          <p:cNvSpPr>
+            <a:spLocks noGrp="1"/>
+          </p:cNvSpPr>
+          <p:nvPr>
+            <p:ph type="title"/>
+          </p:nvPr>
+        </p:nvSpPr>
+        <p:spPr>
+          <a:xfrm>
+            <a:off x="554638" y="381156"/>
+            <a:ext cx="7688400" cy="1071126"/>
+          </a:xfrm>
+        </p:spPr>
+        <p:txBody>
+          <a:bodyPr/>
+          <a:lstStyle/>
+          <a:p>
+            <a:r>
+              <a:rPr lang="en-US" sz="1800" dirty="0"/>
+              <a:t>Analyzing the three most positively influenced clusters when the U.S. decided to slap trade war against China on June 28, 2016</a:t>
+            </a:r>
+          </a:p>
+        </p:txBody>
+      </p:sp>
+      <p:pic>
+        <p:nvPicPr>
+          <p:cNvPr id="3" name="Picture 2">
+            <a:extLst>
+              <a:ext uri="{FF2B5EF4-FFF2-40B4-BE49-F238E27FC236}">
+                <a16:creationId xmlns:a16="http://schemas.microsoft.com/office/drawing/2014/main" id="{2A3F454E-2126-4502-82DB-30B00BFA1F4A}"/>
+              </a:ext>
+            </a:extLst>
+          </p:cNvPr>
+          <p:cNvPicPr>
+            <a:picLocks noChangeAspect="1"/>
+          </p:cNvPicPr>
+          <p:nvPr/>
+        </p:nvPicPr>
+        <p:blipFill>
+          <a:blip r:embed="rId2"/>
+          <a:stretch>
+            <a:fillRect/>
+          </a:stretch>
+        </p:blipFill>
+        <p:spPr>
+          <a:xfrm>
+            <a:off x="2483245" y="1452282"/>
+            <a:ext cx="3639627" cy="2438611"/>
+          </a:xfrm>
+          <a:prstGeom prst="rect">
+            <a:avLst/>
+          </a:prstGeom>
+        </p:spPr>
+      </p:pic>
+    </p:spTree>
+    <p:extLst>
+      <p:ext uri="{BB962C8B-B14F-4D97-AF65-F5344CB8AC3E}">
+        <p14:creationId xmlns:p14="http://schemas.microsoft.com/office/powerpoint/2010/main" val="3489746659"/>
+      </p:ext>
+    </p:extLst>
+  </p:cSld>
+  <p:clrMapOvr>
+    <a:masterClrMapping/>
+  </p:clrMapOvr>
+</p:sld>
+</file>
+
+<file path=ppt/slides/slide9.xml><?xml version="1.0" encoding="utf-8"?>
+<p:sld xmlns:a="http://schemas.openxmlformats.org/drawingml/2006/main" xmlns:r="http://schemas.openxmlformats.org/officeDocument/2006/relationships" xmlns:p="http://schemas.openxmlformats.org/presentationml/2006/main">
+  <p:cSld>
+    <p:spTree>
+      <p:nvGrpSpPr>
+        <p:cNvPr id="1" name=""/>
+        <p:cNvGrpSpPr/>
+        <p:nvPr/>
+      </p:nvGrpSpPr>
+      <p:grpSpPr>
+        <a:xfrm>
+          <a:off x="0" y="0"/>
+          <a:ext cx="0" cy="0"/>
+          <a:chOff x="0" y="0"/>
+          <a:chExt cx="0" cy="0"/>
+        </a:xfrm>
+      </p:grpSpPr>
+      <p:sp>
+        <p:nvSpPr>
+          <p:cNvPr id="2" name="Title 1">
+            <a:extLst>
+              <a:ext uri="{FF2B5EF4-FFF2-40B4-BE49-F238E27FC236}">
+                <a16:creationId xmlns:a16="http://schemas.microsoft.com/office/drawing/2014/main" id="{F4DA8CC6-8D40-4690-A162-0BD13F347D82}"/>
+              </a:ext>
+            </a:extLst>
+          </p:cNvPr>
+          <p:cNvSpPr>
+            <a:spLocks noGrp="1"/>
+          </p:cNvSpPr>
+          <p:nvPr>
+            <p:ph type="title"/>
+          </p:nvPr>
+        </p:nvSpPr>
+        <p:spPr>
+          <a:xfrm>
+            <a:off x="662214" y="287027"/>
+            <a:ext cx="7688400" cy="849249"/>
+          </a:xfrm>
+        </p:spPr>
+        <p:txBody>
+          <a:bodyPr/>
+          <a:lstStyle/>
+          <a:p>
+            <a:r>
+              <a:rPr lang="en-US" dirty="0"/>
+              <a:t>1</a:t>
+            </a:r>
+            <a:r>
+              <a:rPr lang="en-US" baseline="30000" dirty="0"/>
+              <a:t>st</a:t>
+            </a:r>
+            <a:r>
+              <a:rPr lang="en-US" dirty="0"/>
+              <a:t> cluster</a:t>
+            </a:r>
+          </a:p>
+        </p:txBody>
+      </p:sp>
+      <p:sp>
+        <p:nvSpPr>
+          <p:cNvPr id="4" name="TextBox 3">
+            <a:extLst>
+              <a:ext uri="{FF2B5EF4-FFF2-40B4-BE49-F238E27FC236}">
+                <a16:creationId xmlns:a16="http://schemas.microsoft.com/office/drawing/2014/main" id="{42244D65-D82C-4A15-8841-205412FD819D}"/>
+              </a:ext>
+            </a:extLst>
+          </p:cNvPr>
+          <p:cNvSpPr txBox="1"/>
+          <p:nvPr/>
+        </p:nvSpPr>
+        <p:spPr>
+          <a:xfrm>
+            <a:off x="5244353" y="1902759"/>
+            <a:ext cx="3576918" cy="1169551"/>
+          </a:xfrm>
+          <a:prstGeom prst="rect">
+            <a:avLst/>
+          </a:prstGeom>
+          <a:noFill/>
+        </p:spPr>
+        <p:txBody>
+          <a:bodyPr wrap="square" rtlCol="0">
+            <a:spAutoFit/>
+          </a:bodyPr>
+          <a:lstStyle/>
+          <a:p>
+            <a:r>
+              <a:rPr lang="en-US" dirty="0">
+                <a:solidFill>
+                  <a:schemeClr val="bg1"/>
+                </a:solidFill>
+              </a:rPr>
+              <a:t>The top four industries :</a:t>
+            </a:r>
+          </a:p>
+          <a:p>
+            <a:pPr marL="285750" indent="-285750">
+              <a:buFont typeface="Arial" panose="020B0604020202020204" pitchFamily="34" charset="0"/>
+              <a:buChar char="•"/>
+            </a:pPr>
+            <a:r>
+              <a:rPr lang="en-US" dirty="0">
+                <a:solidFill>
+                  <a:schemeClr val="bg1"/>
+                </a:solidFill>
+              </a:rPr>
+              <a:t>major pharmaceuticals (58) </a:t>
+            </a:r>
+          </a:p>
+          <a:p>
+            <a:pPr marL="285750" indent="-285750">
+              <a:buFont typeface="Arial" panose="020B0604020202020204" pitchFamily="34" charset="0"/>
+              <a:buChar char="•"/>
+            </a:pPr>
+            <a:r>
+              <a:rPr lang="en-US" dirty="0">
+                <a:solidFill>
+                  <a:schemeClr val="bg1"/>
+                </a:solidFill>
+              </a:rPr>
+              <a:t>major banks (38)</a:t>
+            </a:r>
+          </a:p>
+          <a:p>
+            <a:pPr marL="285750" indent="-285750">
+              <a:buFont typeface="Arial" panose="020B0604020202020204" pitchFamily="34" charset="0"/>
+              <a:buChar char="•"/>
+            </a:pPr>
+            <a:r>
+              <a:rPr lang="en-US" dirty="0">
+                <a:solidFill>
+                  <a:schemeClr val="bg1"/>
+                </a:solidFill>
+              </a:rPr>
+              <a:t>Real estate investment (29)</a:t>
+            </a:r>
+          </a:p>
+          <a:p>
+            <a:pPr marL="285750" indent="-285750">
+              <a:buFont typeface="Arial" panose="020B0604020202020204" pitchFamily="34" charset="0"/>
+              <a:buChar char="•"/>
+            </a:pPr>
+            <a:r>
+              <a:rPr lang="en-US" dirty="0">
+                <a:solidFill>
+                  <a:schemeClr val="bg1"/>
+                </a:solidFill>
+              </a:rPr>
+              <a:t>oil &amp; gas (23)</a:t>
+            </a:r>
+          </a:p>
+        </p:txBody>
+      </p:sp>
+      <p:pic>
+        <p:nvPicPr>
+          <p:cNvPr id="5" name="Picture 4">
+            <a:extLst>
+              <a:ext uri="{FF2B5EF4-FFF2-40B4-BE49-F238E27FC236}">
+                <a16:creationId xmlns:a16="http://schemas.microsoft.com/office/drawing/2014/main" id="{84B70490-5192-4B74-9054-C6DDACBBF6DF}"/>
+              </a:ext>
+            </a:extLst>
+          </p:cNvPr>
+          <p:cNvPicPr>
+            <a:picLocks noChangeAspect="1"/>
+          </p:cNvPicPr>
+          <p:nvPr/>
+        </p:nvPicPr>
+        <p:blipFill>
+          <a:blip r:embed="rId2"/>
+          <a:stretch>
+            <a:fillRect/>
+          </a:stretch>
+        </p:blipFill>
+        <p:spPr>
+          <a:xfrm>
+            <a:off x="282390" y="1357742"/>
+            <a:ext cx="4787152" cy="3498731"/>
+          </a:xfrm>
+          <a:prstGeom prst="rect">
+            <a:avLst/>
+          </a:prstGeom>
+        </p:spPr>
+      </p:pic>
+    </p:spTree>
+    <p:extLst>
+      <p:ext uri="{BB962C8B-B14F-4D97-AF65-F5344CB8AC3E}">
+        <p14:creationId xmlns:p14="http://schemas.microsoft.com/office/powerpoint/2010/main" val="4014298962"/>
+      </p:ext>
+    </p:extLst>
+  </p:cSld>
+  <p:clrMapOvr>
+    <a:masterClrMapping/>
+  </p:clrMapOvr>
+</p:sld>
+</file>
+
 <file path=ppt/theme/theme1.xml><?xml version="1.0" encoding="utf-8"?>
 <a:theme xmlns:a="http://schemas.openxmlformats.org/drawingml/2006/main" name="Streamline">
   <a:themeElements>

</xml_diff>